<commit_message>
kalba + pataisymai, saukstai po pietu
</commit_message>
<xml_diff>
--- a/pristatymas/MindaugasKurmauskas.pptx
+++ b/pristatymas/MindaugasKurmauskas.pptx
@@ -2300,7 +2300,7 @@
         <p:spPr>
           <a:xfrm>
             <a:off x="504000" y="1769040"/>
-            <a:ext cx="8870040" cy="4384080"/>
+            <a:ext cx="8870040" cy="4384800"/>
           </a:xfrm>
           <a:prstGeom prst="rect">
             <a:avLst/>
@@ -2417,7 +2417,7 @@
           <a:bodyPr bIns="0" lIns="0" rIns="0" tIns="0" wrap="none"/>
           <a:p>
             <a:r>
-              <a:rPr lang="en-US"/>
+              <a:rPr lang="en-US" sz="1400"/>
               <a:t>&lt;date/time&gt;</a:t>
             </a:r>
             <a:endParaRPr/>
@@ -2448,7 +2448,7 @@
           <a:p>
             <a:pPr algn="ctr"/>
             <a:r>
-              <a:rPr lang="en-US"/>
+              <a:rPr lang="en-US" sz="1400"/>
               <a:t>&lt;footer&gt;</a:t>
             </a:r>
             <a:endParaRPr/>
@@ -2478,8 +2478,8 @@
           <a:bodyPr bIns="0" lIns="0" rIns="0" tIns="0" wrap="none"/>
           <a:p>
             <a:pPr algn="r"/>
-            <a:fld id="{21B1D1D1-E141-4161-B1E1-4131C1612181}" type="slidenum">
-              <a:rPr lang="en-US"/>
+            <a:fld id="{41110111-2131-4191-9111-312131910101}" type="slidenum">
+              <a:rPr lang="en-US" sz="1400"/>
               <a:t>&lt;number&gt;</a:t>
             </a:fld>
             <a:endParaRPr/>
@@ -2752,7 +2752,7 @@
           <a:bodyPr bIns="0" lIns="0" rIns="0" tIns="0" wrap="none"/>
           <a:p>
             <a:pPr algn="r"/>
-            <a:fld id="{C181F121-0191-4131-B181-61F1A1E11191}" type="slidenum">
+            <a:fld id="{B1E101E1-61E1-4121-81C1-3121D1C1A171}" type="slidenum">
               <a:rPr lang="en-US" sz="1400"/>
               <a:t>&lt;number&gt;</a:t>
             </a:fld>
@@ -2916,7 +2916,7 @@
       </p:grpSpPr>
       <p:sp>
         <p:nvSpPr>
-          <p:cNvPr id="95" name="TextShape 1"/>
+          <p:cNvPr id="96" name="TextShape 1"/>
           <p:cNvSpPr txBox="1"/>
           <p:nvPr/>
         </p:nvSpPr>
@@ -2945,7 +2945,7 @@
       </p:sp>
       <p:sp>
         <p:nvSpPr>
-          <p:cNvPr id="96" name="TextShape 2"/>
+          <p:cNvPr id="97" name="TextShape 2"/>
           <p:cNvSpPr txBox="1"/>
           <p:nvPr/>
         </p:nvSpPr>
@@ -3029,7 +3029,7 @@
       </p:grpSpPr>
       <p:sp>
         <p:nvSpPr>
-          <p:cNvPr id="97" name="TextShape 1"/>
+          <p:cNvPr id="98" name="TextShape 1"/>
           <p:cNvSpPr txBox="1"/>
           <p:nvPr/>
         </p:nvSpPr>
@@ -3058,7 +3058,7 @@
       </p:sp>
       <p:sp>
         <p:nvSpPr>
-          <p:cNvPr id="98" name="TextShape 2"/>
+          <p:cNvPr id="99" name="TextShape 2"/>
           <p:cNvSpPr txBox="1"/>
           <p:nvPr/>
         </p:nvSpPr>
@@ -3988,13 +3988,7 @@
               <a:rPr lang="en-US" sz="2200">
                 <a:latin typeface="Times New Roman"/>
               </a:rPr>
-              <a:t>Palyginti įėjimo ir išėjimo į trūkį laikai esant </a:t>
-            </a:r>
-            <a:r>
-              <a:rPr lang="en-US" sz="2200">
-                <a:latin typeface="Times New Roman"/>
-              </a:rPr>
-              <a:t>100MHz taktiniam dažniui.</a:t>
+              <a:t>Palyginti įėjimo ir išėjimo į trūkį laikai esant 100MHz taktiniam dažniui.</a:t>
             </a:r>
             <a:endParaRPr/>
           </a:p>
@@ -4164,6 +4158,28 @@
           </a:p>
         </p:txBody>
       </p:sp>
+      <p:pic>
+        <p:nvPicPr>
+          <p:cNvPr descr="" id="89" name=""/>
+          <p:cNvPicPr/>
+          <p:nvPr/>
+        </p:nvPicPr>
+        <p:blipFill>
+          <a:blip r:embed="rId1"/>
+          <a:stretch>
+            <a:fillRect/>
+          </a:stretch>
+        </p:blipFill>
+        <p:spPr>
+          <a:xfrm>
+            <a:off x="1371600" y="1280160"/>
+            <a:ext cx="6858000" cy="4451400"/>
+          </a:xfrm>
+          <a:prstGeom prst="rect">
+            <a:avLst/>
+          </a:prstGeom>
+        </p:spPr>
+      </p:pic>
     </p:spTree>
   </p:cSld>
   <p:timing>
@@ -4217,7 +4233,7 @@
       </p:grpSpPr>
       <p:sp>
         <p:nvSpPr>
-          <p:cNvPr id="89" name="TextShape 1"/>
+          <p:cNvPr id="90" name="TextShape 1"/>
           <p:cNvSpPr txBox="1"/>
           <p:nvPr/>
         </p:nvSpPr>
@@ -4246,7 +4262,7 @@
       </p:sp>
       <p:sp>
         <p:nvSpPr>
-          <p:cNvPr id="90" name="TextShape 2"/>
+          <p:cNvPr id="91" name="TextShape 2"/>
           <p:cNvSpPr txBox="1"/>
           <p:nvPr/>
         </p:nvSpPr>
@@ -4271,7 +4287,7 @@
               <a:rPr i="1" lang="en-US">
                 <a:latin typeface="Times New Roman"/>
               </a:rPr>
-              <a:t>R4 trūkio laikas 730ns. M4 – 200ns. 100MHz  taktinis dažnis.</a:t>
+              <a:t>R4 trūkio laikas 730ns. M4 – 270ns. 100MHz  taktinis dažnis.</a:t>
             </a:r>
             <a:endParaRPr/>
           </a:p>
@@ -4279,7 +4295,7 @@
       </p:sp>
       <p:pic>
         <p:nvPicPr>
-          <p:cNvPr descr="" id="91" name=""/>
+          <p:cNvPr descr="" id="92" name=""/>
           <p:cNvPicPr/>
           <p:nvPr/>
         </p:nvPicPr>
@@ -4301,7 +4317,7 @@
       </p:pic>
       <p:sp>
         <p:nvSpPr>
-          <p:cNvPr id="92" name="TextShape 3"/>
+          <p:cNvPr id="93" name="TextShape 3"/>
           <p:cNvSpPr txBox="1"/>
           <p:nvPr/>
         </p:nvSpPr>
@@ -4399,7 +4415,7 @@
       </p:grpSpPr>
       <p:sp>
         <p:nvSpPr>
-          <p:cNvPr id="93" name="TextShape 1"/>
+          <p:cNvPr id="94" name="TextShape 1"/>
           <p:cNvSpPr txBox="1"/>
           <p:nvPr/>
         </p:nvSpPr>
@@ -4428,7 +4444,7 @@
       </p:sp>
       <p:sp>
         <p:nvSpPr>
-          <p:cNvPr id="94" name="TextShape 2"/>
+          <p:cNvPr id="95" name="TextShape 2"/>
           <p:cNvSpPr txBox="1"/>
           <p:nvPr/>
         </p:nvSpPr>

</xml_diff>